<commit_message>
update singleton pattern presentation
</commit_message>
<xml_diff>
--- a/Design Patterns/Design Patterns.pptx
+++ b/Design Patterns/Design Patterns.pptx
@@ -19,15 +19,18 @@
     <p:sldId id="277" r:id="rId13"/>
     <p:sldId id="283" r:id="rId14"/>
     <p:sldId id="285" r:id="rId15"/>
-    <p:sldId id="286" r:id="rId16"/>
-    <p:sldId id="292" r:id="rId17"/>
-    <p:sldId id="291" r:id="rId18"/>
+    <p:sldId id="291" r:id="rId16"/>
+    <p:sldId id="286" r:id="rId17"/>
+    <p:sldId id="292" r:id="rId18"/>
     <p:sldId id="288" r:id="rId19"/>
     <p:sldId id="290" r:id="rId20"/>
     <p:sldId id="296" r:id="rId21"/>
     <p:sldId id="297" r:id="rId22"/>
-    <p:sldId id="294" r:id="rId23"/>
-    <p:sldId id="295" r:id="rId24"/>
+    <p:sldId id="299" r:id="rId23"/>
+    <p:sldId id="300" r:id="rId24"/>
+    <p:sldId id="301" r:id="rId25"/>
+    <p:sldId id="294" r:id="rId26"/>
+    <p:sldId id="295" r:id="rId27"/>
   </p:sldIdLst>
   <p:sldSz cx="9144000" cy="5143500" type="screen16x9"/>
   <p:notesSz cx="6858000" cy="9144000"/>
@@ -5178,23 +5181,7 @@
                   <a:srgbClr val="96B51A"/>
                 </a:solidFill>
               </a:rPr>
-              <a:t>Chain of </a:t>
-            </a:r>
-            <a:r>
-              <a:rPr lang="en-US" sz="3400" spc="-1" dirty="0" err="1">
-                <a:solidFill>
-                  <a:srgbClr val="96B51A"/>
-                </a:solidFill>
-              </a:rPr>
-              <a:t>Responsability</a:t>
-            </a:r>
-            <a:r>
-              <a:rPr lang="en-US" sz="3400" spc="-1" dirty="0">
-                <a:solidFill>
-                  <a:srgbClr val="96B51A"/>
-                </a:solidFill>
-              </a:rPr>
-              <a:t> Pattern</a:t>
+              <a:t>Chain of Responsibility Pattern</a:t>
             </a:r>
           </a:p>
         </p:txBody>
@@ -5659,7 +5646,7 @@
                 </a:solidFill>
                 <a:cs typeface="Arial" panose="020B0604020202020204"/>
               </a:rPr>
-              <a:t>Advantage / Disadvantage</a:t>
+              <a:t>When to use it? </a:t>
             </a:r>
           </a:p>
         </p:txBody>
@@ -5669,7 +5656,7 @@
           <p:cNvPr id="2" name="TextBox 1">
             <a:extLst>
               <a:ext uri="{FF2B5EF4-FFF2-40B4-BE49-F238E27FC236}">
-                <a16:creationId xmlns:a16="http://schemas.microsoft.com/office/drawing/2014/main" id="{8B1319CA-707D-4666-A070-B3803D5C1BAF}"/>
+                <a16:creationId xmlns:a16="http://schemas.microsoft.com/office/drawing/2014/main" id="{AA0A5C92-09F4-49B1-8318-95D3B3487FE8}"/>
               </a:ext>
             </a:extLst>
           </p:cNvPr>
@@ -5678,8 +5665,8 @@
         </p:nvSpPr>
         <p:spPr>
           <a:xfrm>
-            <a:off x="405635" y="1149724"/>
-            <a:ext cx="6579956" cy="2739211"/>
+            <a:off x="254520" y="1048372"/>
+            <a:ext cx="5869833" cy="2677656"/>
           </a:xfrm>
           <a:prstGeom prst="rect">
             <a:avLst/>
@@ -5692,18 +5679,24 @@
           </a:bodyPr>
           <a:lstStyle/>
           <a:p>
-            <a:pPr algn="just"/>
+            <a:pPr marL="285750" indent="-285750" algn="just">
+              <a:buFont typeface="Arial" panose="020B0604020202020204" pitchFamily="34" charset="0"/>
+              <a:buChar char="•"/>
+            </a:pPr>
             <a:r>
               <a:rPr lang="en-US" sz="1400" dirty="0">
                 <a:solidFill>
                   <a:schemeClr val="bg1"/>
                 </a:solidFill>
               </a:rPr>
-              <a:t>Advantage:</a:t>
-            </a:r>
-          </a:p>
-          <a:p>
-            <a:pPr algn="just"/>
+              <a:t>Decouple a request’s sender and receiver </a:t>
+            </a:r>
+          </a:p>
+          <a:p>
+            <a:pPr marL="285750" indent="-285750" algn="just">
+              <a:buFont typeface="Arial" panose="020B0604020202020204" pitchFamily="34" charset="0"/>
+              <a:buChar char="•"/>
+            </a:pPr>
             <a:endParaRPr lang="en-US" sz="1400" dirty="0">
               <a:solidFill>
                 <a:schemeClr val="bg1"/>
@@ -5711,7 +5704,7 @@
             </a:endParaRPr>
           </a:p>
           <a:p>
-            <a:pPr marL="342900" indent="-342900" algn="just">
+            <a:pPr marL="285750" indent="-285750" algn="just">
               <a:buFont typeface="Arial" panose="020B0604020202020204" pitchFamily="34" charset="0"/>
               <a:buChar char="•"/>
             </a:pPr>
@@ -5721,11 +5714,11 @@
                   <a:schemeClr val="bg1"/>
                 </a:solidFill>
               </a:rPr>
-              <a:t>Reduce coupling </a:t>
-            </a:r>
-          </a:p>
-          <a:p>
-            <a:pPr marL="800100" lvl="1" indent="-342900" algn="just">
+              <a:t>Multiple objects, determined at runtime, are candidates to handle a request</a:t>
+            </a:r>
+          </a:p>
+          <a:p>
+            <a:pPr marL="742950" lvl="1" indent="-285750" algn="just">
               <a:buFont typeface="Arial" panose="020B0604020202020204" pitchFamily="34" charset="0"/>
               <a:buChar char="•"/>
             </a:pPr>
@@ -5735,11 +5728,11 @@
                   <a:schemeClr val="bg1"/>
                 </a:solidFill>
               </a:rPr>
-              <a:t>avoids attaching the sender of a request to its receiver, giving this way other objects the possibility of handling the request too.</a:t>
-            </a:r>
-          </a:p>
-          <a:p>
-            <a:pPr marL="342900" indent="-342900" algn="just">
+              <a:t>The handler is not known in advance</a:t>
+            </a:r>
+          </a:p>
+          <a:p>
+            <a:pPr marL="285750" indent="-285750" algn="just">
               <a:buFont typeface="Arial" panose="020B0604020202020204" pitchFamily="34" charset="0"/>
               <a:buChar char="•"/>
             </a:pPr>
@@ -5750,7 +5743,7 @@
             </a:endParaRPr>
           </a:p>
           <a:p>
-            <a:pPr marL="342900" indent="-342900" algn="just">
+            <a:pPr marL="285750" indent="-285750" algn="just">
               <a:buFont typeface="Arial" panose="020B0604020202020204" pitchFamily="34" charset="0"/>
               <a:buChar char="•"/>
             </a:pPr>
@@ -5760,25 +5753,11 @@
                   <a:schemeClr val="bg1"/>
                 </a:solidFill>
               </a:rPr>
-              <a:t>Object doesn’t need to know the chain structure </a:t>
-            </a:r>
-          </a:p>
-          <a:p>
-            <a:pPr marL="800100" lvl="1" indent="-342900" algn="just">
-              <a:buFont typeface="Arial" panose="020B0604020202020204" pitchFamily="34" charset="0"/>
-              <a:buChar char="•"/>
-            </a:pPr>
-            <a:r>
-              <a:rPr lang="en-US" sz="1400" dirty="0">
-                <a:solidFill>
-                  <a:schemeClr val="bg1"/>
-                </a:solidFill>
-              </a:rPr>
-              <a:t>The objects become parts of a chain and the request is sent from one object to another across the chain until one of the objects will handle it.</a:t>
-            </a:r>
-          </a:p>
-          <a:p>
-            <a:pPr marL="342900" indent="-342900" algn="just">
+              <a:t>specify handlers is not necessary </a:t>
+            </a:r>
+          </a:p>
+          <a:p>
+            <a:pPr marL="285750" indent="-285750" algn="just">
               <a:buFont typeface="Arial" panose="020B0604020202020204" pitchFamily="34" charset="0"/>
               <a:buChar char="•"/>
             </a:pPr>
@@ -5789,7 +5768,7 @@
             </a:endParaRPr>
           </a:p>
           <a:p>
-            <a:pPr marL="342900" indent="-342900" algn="just">
+            <a:pPr marL="285750" indent="-285750" algn="just">
               <a:buFont typeface="Arial" panose="020B0604020202020204" pitchFamily="34" charset="0"/>
               <a:buChar char="•"/>
             </a:pPr>
@@ -5799,26 +5778,42 @@
                   <a:schemeClr val="bg1"/>
                 </a:solidFill>
               </a:rPr>
-              <a:t>Enhance flexibility of object assigned duties (add, change or remove responsibilities throw the chain</a:t>
-            </a:r>
-            <a:r>
-              <a:rPr lang="en-US" dirty="0">
+              <a:t>The object can be handle by one or more requests </a:t>
+            </a:r>
+          </a:p>
+          <a:p>
+            <a:pPr marL="285750" indent="-285750" algn="just">
+              <a:buFont typeface="Arial" panose="020B0604020202020204" pitchFamily="34" charset="0"/>
+              <a:buChar char="•"/>
+            </a:pPr>
+            <a:endParaRPr lang="en-US" sz="1400" dirty="0">
+              <a:solidFill>
+                <a:schemeClr val="bg1"/>
+              </a:solidFill>
+            </a:endParaRPr>
+          </a:p>
+          <a:p>
+            <a:pPr marL="285750" indent="-285750" algn="just">
+              <a:buFont typeface="Arial" panose="020B0604020202020204" pitchFamily="34" charset="0"/>
+              <a:buChar char="•"/>
+            </a:pPr>
+            <a:r>
+              <a:rPr lang="en-US" sz="1400" dirty="0">
                 <a:solidFill>
                   <a:schemeClr val="bg1"/>
                 </a:solidFill>
               </a:rPr>
-              <a:t>) </a:t>
-            </a:r>
-            <a:endParaRPr lang="en-US" dirty="0"/>
+              <a:t>It’s wished that the request is addressed to a group of objects without explicitly specifying its receiver</a:t>
+            </a:r>
           </a:p>
         </p:txBody>
       </p:sp>
       <p:pic>
         <p:nvPicPr>
-          <p:cNvPr id="3080" name="Picture 8" descr="Related image">
+          <p:cNvPr id="4100" name="Picture 4" descr="Image result for homer thinking with glasses without background">
             <a:extLst>
               <a:ext uri="{FF2B5EF4-FFF2-40B4-BE49-F238E27FC236}">
-                <a16:creationId xmlns:a16="http://schemas.microsoft.com/office/drawing/2014/main" id="{7195DF56-9A98-41BE-83E1-DF60B5FDF8EC}"/>
+                <a16:creationId xmlns:a16="http://schemas.microsoft.com/office/drawing/2014/main" id="{5EC6A25D-704D-42F6-9728-C0D4D014EF54}"/>
               </a:ext>
             </a:extLst>
           </p:cNvPr>
@@ -5842,28 +5837,20 @@
         </p:blipFill>
         <p:spPr bwMode="auto">
           <a:xfrm>
-            <a:off x="7486262" y="1680840"/>
-            <a:ext cx="1252103" cy="1544276"/>
+            <a:off x="6653171" y="1559256"/>
+            <a:ext cx="1707490" cy="2024988"/>
           </a:xfrm>
           <a:prstGeom prst="rect">
             <a:avLst/>
           </a:prstGeom>
           <a:noFill/>
-          <a:extLst>
-            <a:ext uri="{909E8E84-426E-40DD-AFC4-6F175D3DCCD1}">
-              <a14:hiddenFill xmlns:a14="http://schemas.microsoft.com/office/drawing/2010/main">
-                <a:solidFill>
-                  <a:srgbClr val="FFFFFF"/>
-                </a:solidFill>
-              </a14:hiddenFill>
-            </a:ext>
-          </a:extLst>
+          <a:extLst/>
         </p:spPr>
       </p:pic>
     </p:spTree>
     <p:extLst>
       <p:ext uri="{BB962C8B-B14F-4D97-AF65-F5344CB8AC3E}">
-        <p14:creationId xmlns:p14="http://schemas.microsoft.com/office/powerpoint/2010/main" val="595242497"/>
+        <p14:creationId xmlns:p14="http://schemas.microsoft.com/office/powerpoint/2010/main" val="1440524593"/>
       </p:ext>
     </p:extLst>
   </p:cSld>
@@ -6018,12 +6005,161 @@
           </a:p>
         </p:txBody>
       </p:sp>
+      <p:sp>
+        <p:nvSpPr>
+          <p:cNvPr id="2" name="TextBox 1">
+            <a:extLst>
+              <a:ext uri="{FF2B5EF4-FFF2-40B4-BE49-F238E27FC236}">
+                <a16:creationId xmlns:a16="http://schemas.microsoft.com/office/drawing/2014/main" id="{8B1319CA-707D-4666-A070-B3803D5C1BAF}"/>
+              </a:ext>
+            </a:extLst>
+          </p:cNvPr>
+          <p:cNvSpPr txBox="1"/>
+          <p:nvPr/>
+        </p:nvSpPr>
+        <p:spPr>
+          <a:xfrm>
+            <a:off x="405635" y="1149724"/>
+            <a:ext cx="6579956" cy="2739211"/>
+          </a:xfrm>
+          <a:prstGeom prst="rect">
+            <a:avLst/>
+          </a:prstGeom>
+          <a:noFill/>
+        </p:spPr>
+        <p:txBody>
+          <a:bodyPr wrap="square" rtlCol="0">
+            <a:spAutoFit/>
+          </a:bodyPr>
+          <a:lstStyle/>
+          <a:p>
+            <a:pPr algn="just"/>
+            <a:r>
+              <a:rPr lang="en-US" sz="1400" dirty="0">
+                <a:solidFill>
+                  <a:schemeClr val="bg1"/>
+                </a:solidFill>
+              </a:rPr>
+              <a:t>Advantage:</a:t>
+            </a:r>
+          </a:p>
+          <a:p>
+            <a:pPr algn="just"/>
+            <a:endParaRPr lang="en-US" sz="1400" dirty="0">
+              <a:solidFill>
+                <a:schemeClr val="bg1"/>
+              </a:solidFill>
+            </a:endParaRPr>
+          </a:p>
+          <a:p>
+            <a:pPr marL="342900" indent="-342900" algn="just">
+              <a:buFont typeface="Arial" panose="020B0604020202020204" pitchFamily="34" charset="0"/>
+              <a:buChar char="•"/>
+            </a:pPr>
+            <a:r>
+              <a:rPr lang="en-US" sz="1400" dirty="0">
+                <a:solidFill>
+                  <a:schemeClr val="bg1"/>
+                </a:solidFill>
+              </a:rPr>
+              <a:t>Reduce coupling </a:t>
+            </a:r>
+          </a:p>
+          <a:p>
+            <a:pPr marL="800100" lvl="1" indent="-342900" algn="just">
+              <a:buFont typeface="Arial" panose="020B0604020202020204" pitchFamily="34" charset="0"/>
+              <a:buChar char="•"/>
+            </a:pPr>
+            <a:r>
+              <a:rPr lang="en-US" sz="1400" dirty="0">
+                <a:solidFill>
+                  <a:schemeClr val="bg1"/>
+                </a:solidFill>
+              </a:rPr>
+              <a:t>avoids attaching the sender of a request to its receiver, giving this way other objects the possibility of handling the request too.</a:t>
+            </a:r>
+          </a:p>
+          <a:p>
+            <a:pPr marL="342900" indent="-342900" algn="just">
+              <a:buFont typeface="Arial" panose="020B0604020202020204" pitchFamily="34" charset="0"/>
+              <a:buChar char="•"/>
+            </a:pPr>
+            <a:endParaRPr lang="en-US" sz="1400" dirty="0">
+              <a:solidFill>
+                <a:schemeClr val="bg1"/>
+              </a:solidFill>
+            </a:endParaRPr>
+          </a:p>
+          <a:p>
+            <a:pPr marL="342900" indent="-342900" algn="just">
+              <a:buFont typeface="Arial" panose="020B0604020202020204" pitchFamily="34" charset="0"/>
+              <a:buChar char="•"/>
+            </a:pPr>
+            <a:r>
+              <a:rPr lang="en-US" sz="1400" dirty="0">
+                <a:solidFill>
+                  <a:schemeClr val="bg1"/>
+                </a:solidFill>
+              </a:rPr>
+              <a:t>Object doesn’t need to know the chain structure </a:t>
+            </a:r>
+          </a:p>
+          <a:p>
+            <a:pPr marL="800100" lvl="1" indent="-342900" algn="just">
+              <a:buFont typeface="Arial" panose="020B0604020202020204" pitchFamily="34" charset="0"/>
+              <a:buChar char="•"/>
+            </a:pPr>
+            <a:r>
+              <a:rPr lang="en-US" sz="1400" dirty="0">
+                <a:solidFill>
+                  <a:schemeClr val="bg1"/>
+                </a:solidFill>
+              </a:rPr>
+              <a:t>The objects become parts of a chain and the request is sent from one object to another across the chain until one of the objects will handle it.</a:t>
+            </a:r>
+          </a:p>
+          <a:p>
+            <a:pPr marL="342900" indent="-342900" algn="just">
+              <a:buFont typeface="Arial" panose="020B0604020202020204" pitchFamily="34" charset="0"/>
+              <a:buChar char="•"/>
+            </a:pPr>
+            <a:endParaRPr lang="en-US" sz="1400" dirty="0">
+              <a:solidFill>
+                <a:schemeClr val="bg1"/>
+              </a:solidFill>
+            </a:endParaRPr>
+          </a:p>
+          <a:p>
+            <a:pPr marL="342900" indent="-342900" algn="just">
+              <a:buFont typeface="Arial" panose="020B0604020202020204" pitchFamily="34" charset="0"/>
+              <a:buChar char="•"/>
+            </a:pPr>
+            <a:r>
+              <a:rPr lang="en-US" sz="1400" dirty="0">
+                <a:solidFill>
+                  <a:schemeClr val="bg1"/>
+                </a:solidFill>
+              </a:rPr>
+              <a:t>Enhance flexibility of object assigned duties (add, change or remove responsibilities throw the chain</a:t>
+            </a:r>
+            <a:r>
+              <a:rPr lang="en-US" dirty="0">
+                <a:solidFill>
+                  <a:schemeClr val="bg1"/>
+                </a:solidFill>
+              </a:rPr>
+              <a:t>) </a:t>
+            </a:r>
+            <a:endParaRPr lang="en-US" dirty="0"/>
+          </a:p>
+        </p:txBody>
+      </p:sp>
       <p:pic>
         <p:nvPicPr>
-          <p:cNvPr id="2052" name="Picture 4" descr="Image result for homer doh without background">
+          <p:cNvPr id="3080" name="Picture 8" descr="Related image">
             <a:extLst>
               <a:ext uri="{FF2B5EF4-FFF2-40B4-BE49-F238E27FC236}">
-                <a16:creationId xmlns:a16="http://schemas.microsoft.com/office/drawing/2014/main" id="{11E286D0-5068-4F11-B530-2A07C6DE6257}"/>
+                <a16:creationId xmlns:a16="http://schemas.microsoft.com/office/drawing/2014/main" id="{7195DF56-9A98-41BE-83E1-DF60B5FDF8EC}"/>
               </a:ext>
             </a:extLst>
           </p:cNvPr>
@@ -6047,8 +6183,8 @@
         </p:blipFill>
         <p:spPr bwMode="auto">
           <a:xfrm>
-            <a:off x="7228873" y="1877087"/>
-            <a:ext cx="1041660" cy="1222930"/>
+            <a:off x="7486262" y="1680840"/>
+            <a:ext cx="1252103" cy="1544276"/>
           </a:xfrm>
           <a:prstGeom prst="rect">
             <a:avLst/>
@@ -6065,139 +6201,10 @@
           </a:extLst>
         </p:spPr>
       </p:pic>
-      <p:sp>
-        <p:nvSpPr>
-          <p:cNvPr id="8" name="TextBox 7">
-            <a:extLst>
-              <a:ext uri="{FF2B5EF4-FFF2-40B4-BE49-F238E27FC236}">
-                <a16:creationId xmlns:a16="http://schemas.microsoft.com/office/drawing/2014/main" id="{9C617690-E301-490D-911B-C2A27BA0B8DA}"/>
-              </a:ext>
-            </a:extLst>
-          </p:cNvPr>
-          <p:cNvSpPr txBox="1"/>
-          <p:nvPr/>
-        </p:nvSpPr>
-        <p:spPr>
-          <a:xfrm>
-            <a:off x="405634" y="1149724"/>
-            <a:ext cx="5920737" cy="2760612"/>
-          </a:xfrm>
-          <a:prstGeom prst="rect">
-            <a:avLst/>
-          </a:prstGeom>
-          <a:noFill/>
-        </p:spPr>
-        <p:txBody>
-          <a:bodyPr wrap="square" rtlCol="0">
-            <a:spAutoFit/>
-          </a:bodyPr>
-          <a:lstStyle/>
-          <a:p>
-            <a:pPr algn="just"/>
-            <a:r>
-              <a:rPr lang="en-US" sz="1400" dirty="0">
-                <a:solidFill>
-                  <a:schemeClr val="bg1"/>
-                </a:solidFill>
-              </a:rPr>
-              <a:t>Disadvantage:</a:t>
-            </a:r>
-          </a:p>
-          <a:p>
-            <a:pPr marL="742950" lvl="1" indent="-285750" algn="just">
-              <a:buFont typeface="Arial" panose="020B0604020202020204" pitchFamily="34" charset="0"/>
-              <a:buChar char="•"/>
-            </a:pPr>
-            <a:r>
-              <a:rPr lang="en-US" sz="1400" dirty="0">
-                <a:solidFill>
-                  <a:schemeClr val="bg1"/>
-                </a:solidFill>
-              </a:rPr>
-              <a:t>Easy to broke: if the developer doesn’t call the next handler the request can be lost on the way. (the execution is handled by subclasses instead of the super class)</a:t>
-            </a:r>
-          </a:p>
-          <a:p>
-            <a:pPr marL="742950" lvl="1" indent="-285750" algn="just">
-              <a:buFont typeface="Arial" panose="020B0604020202020204" pitchFamily="34" charset="0"/>
-              <a:buChar char="•"/>
-            </a:pPr>
-            <a:endParaRPr lang="en-US" sz="1400" dirty="0">
-              <a:solidFill>
-                <a:schemeClr val="bg1"/>
-              </a:solidFill>
-            </a:endParaRPr>
-          </a:p>
-          <a:p>
-            <a:pPr marL="742950" lvl="1" indent="-285750" algn="just">
-              <a:buFont typeface="Arial" panose="020B0604020202020204" pitchFamily="34" charset="0"/>
-              <a:buChar char="•"/>
-            </a:pPr>
-            <a:r>
-              <a:rPr lang="en-US" sz="1400" dirty="0">
-                <a:solidFill>
-                  <a:schemeClr val="bg1"/>
-                </a:solidFill>
-              </a:rPr>
-              <a:t>some requests may end up unhandled due to the wrong implementation of concrete handler</a:t>
-            </a:r>
-          </a:p>
-          <a:p>
-            <a:pPr marL="742950" lvl="1" indent="-285750" algn="just">
-              <a:buFont typeface="Arial" panose="020B0604020202020204" pitchFamily="34" charset="0"/>
-              <a:buChar char="•"/>
-            </a:pPr>
-            <a:endParaRPr lang="en-US" sz="1400" dirty="0">
-              <a:solidFill>
-                <a:schemeClr val="bg1"/>
-              </a:solidFill>
-            </a:endParaRPr>
-          </a:p>
-          <a:p>
-            <a:pPr marL="742950" lvl="1" indent="-285750" algn="just">
-              <a:buFont typeface="Arial" panose="020B0604020202020204" pitchFamily="34" charset="0"/>
-              <a:buChar char="•"/>
-            </a:pPr>
-            <a:r>
-              <a:rPr lang="en-US" sz="1400" dirty="0">
-                <a:solidFill>
-                  <a:schemeClr val="bg1"/>
-                </a:solidFill>
-              </a:rPr>
-              <a:t>Performance can be affected</a:t>
-            </a:r>
-          </a:p>
-          <a:p>
-            <a:pPr marL="742950" lvl="1" indent="-285750" algn="just">
-              <a:buFont typeface="Arial" panose="020B0604020202020204" pitchFamily="34" charset="0"/>
-              <a:buChar char="•"/>
-            </a:pPr>
-            <a:endParaRPr lang="en-US" sz="1400" dirty="0">
-              <a:solidFill>
-                <a:schemeClr val="bg1"/>
-              </a:solidFill>
-            </a:endParaRPr>
-          </a:p>
-          <a:p>
-            <a:pPr marL="742950" lvl="1" indent="-285750" algn="just">
-              <a:buFont typeface="Arial" panose="020B0604020202020204" pitchFamily="34" charset="0"/>
-              <a:buChar char="•"/>
-            </a:pPr>
-            <a:r>
-              <a:rPr lang="en-US" sz="1400" dirty="0">
-                <a:solidFill>
-                  <a:schemeClr val="bg1"/>
-                </a:solidFill>
-              </a:rPr>
-              <a:t>Debugging is not easy to do because the implementation may cause cycle calls</a:t>
-            </a:r>
-          </a:p>
-        </p:txBody>
-      </p:sp>
     </p:spTree>
     <p:extLst>
       <p:ext uri="{BB962C8B-B14F-4D97-AF65-F5344CB8AC3E}">
-        <p14:creationId xmlns:p14="http://schemas.microsoft.com/office/powerpoint/2010/main" val="981103599"/>
+        <p14:creationId xmlns:p14="http://schemas.microsoft.com/office/powerpoint/2010/main" val="595242497"/>
       </p:ext>
     </p:extLst>
   </p:cSld>
@@ -6347,174 +6354,17 @@
                 </a:solidFill>
                 <a:cs typeface="Arial" panose="020B0604020202020204"/>
               </a:rPr>
-              <a:t>When to use it? </a:t>
-            </a:r>
-          </a:p>
-        </p:txBody>
-      </p:sp>
-      <p:sp>
-        <p:nvSpPr>
-          <p:cNvPr id="2" name="TextBox 1">
+              <a:t>Advantage / Disadvantage</a:t>
+            </a:r>
+          </a:p>
+        </p:txBody>
+      </p:sp>
+      <p:pic>
+        <p:nvPicPr>
+          <p:cNvPr id="2052" name="Picture 4" descr="Image result for homer doh without background">
             <a:extLst>
               <a:ext uri="{FF2B5EF4-FFF2-40B4-BE49-F238E27FC236}">
-                <a16:creationId xmlns:a16="http://schemas.microsoft.com/office/drawing/2014/main" id="{AA0A5C92-09F4-49B1-8318-95D3B3487FE8}"/>
-              </a:ext>
-            </a:extLst>
-          </p:cNvPr>
-          <p:cNvSpPr txBox="1"/>
-          <p:nvPr/>
-        </p:nvSpPr>
-        <p:spPr>
-          <a:xfrm>
-            <a:off x="254520" y="1048372"/>
-            <a:ext cx="5869833" cy="2677656"/>
-          </a:xfrm>
-          <a:prstGeom prst="rect">
-            <a:avLst/>
-          </a:prstGeom>
-          <a:noFill/>
-        </p:spPr>
-        <p:txBody>
-          <a:bodyPr wrap="square" rtlCol="0">
-            <a:spAutoFit/>
-          </a:bodyPr>
-          <a:lstStyle/>
-          <a:p>
-            <a:pPr marL="285750" indent="-285750" algn="just">
-              <a:buFont typeface="Arial" panose="020B0604020202020204" pitchFamily="34" charset="0"/>
-              <a:buChar char="•"/>
-            </a:pPr>
-            <a:r>
-              <a:rPr lang="en-US" sz="1400" dirty="0">
-                <a:solidFill>
-                  <a:schemeClr val="bg1"/>
-                </a:solidFill>
-              </a:rPr>
-              <a:t>Decouple a request’s sender and receiver </a:t>
-            </a:r>
-          </a:p>
-          <a:p>
-            <a:pPr marL="285750" indent="-285750" algn="just">
-              <a:buFont typeface="Arial" panose="020B0604020202020204" pitchFamily="34" charset="0"/>
-              <a:buChar char="•"/>
-            </a:pPr>
-            <a:endParaRPr lang="en-US" sz="1400" dirty="0">
-              <a:solidFill>
-                <a:schemeClr val="bg1"/>
-              </a:solidFill>
-            </a:endParaRPr>
-          </a:p>
-          <a:p>
-            <a:pPr marL="285750" indent="-285750" algn="just">
-              <a:buFont typeface="Arial" panose="020B0604020202020204" pitchFamily="34" charset="0"/>
-              <a:buChar char="•"/>
-            </a:pPr>
-            <a:r>
-              <a:rPr lang="en-US" sz="1400" dirty="0">
-                <a:solidFill>
-                  <a:schemeClr val="bg1"/>
-                </a:solidFill>
-              </a:rPr>
-              <a:t>Multiple objects, determined at runtime, are candidates to handle a request</a:t>
-            </a:r>
-          </a:p>
-          <a:p>
-            <a:pPr marL="742950" lvl="1" indent="-285750" algn="just">
-              <a:buFont typeface="Arial" panose="020B0604020202020204" pitchFamily="34" charset="0"/>
-              <a:buChar char="•"/>
-            </a:pPr>
-            <a:r>
-              <a:rPr lang="en-US" sz="1400" dirty="0">
-                <a:solidFill>
-                  <a:schemeClr val="bg1"/>
-                </a:solidFill>
-              </a:rPr>
-              <a:t>The handler is not known in advance</a:t>
-            </a:r>
-          </a:p>
-          <a:p>
-            <a:pPr marL="285750" indent="-285750" algn="just">
-              <a:buFont typeface="Arial" panose="020B0604020202020204" pitchFamily="34" charset="0"/>
-              <a:buChar char="•"/>
-            </a:pPr>
-            <a:endParaRPr lang="en-US" sz="1400" dirty="0">
-              <a:solidFill>
-                <a:schemeClr val="bg1"/>
-              </a:solidFill>
-            </a:endParaRPr>
-          </a:p>
-          <a:p>
-            <a:pPr marL="285750" indent="-285750" algn="just">
-              <a:buFont typeface="Arial" panose="020B0604020202020204" pitchFamily="34" charset="0"/>
-              <a:buChar char="•"/>
-            </a:pPr>
-            <a:r>
-              <a:rPr lang="en-US" sz="1400" dirty="0">
-                <a:solidFill>
-                  <a:schemeClr val="bg1"/>
-                </a:solidFill>
-              </a:rPr>
-              <a:t>specify handlers is not necessary </a:t>
-            </a:r>
-          </a:p>
-          <a:p>
-            <a:pPr marL="285750" indent="-285750" algn="just">
-              <a:buFont typeface="Arial" panose="020B0604020202020204" pitchFamily="34" charset="0"/>
-              <a:buChar char="•"/>
-            </a:pPr>
-            <a:endParaRPr lang="en-US" sz="1400" dirty="0">
-              <a:solidFill>
-                <a:schemeClr val="bg1"/>
-              </a:solidFill>
-            </a:endParaRPr>
-          </a:p>
-          <a:p>
-            <a:pPr marL="285750" indent="-285750" algn="just">
-              <a:buFont typeface="Arial" panose="020B0604020202020204" pitchFamily="34" charset="0"/>
-              <a:buChar char="•"/>
-            </a:pPr>
-            <a:r>
-              <a:rPr lang="en-US" sz="1400" dirty="0">
-                <a:solidFill>
-                  <a:schemeClr val="bg1"/>
-                </a:solidFill>
-              </a:rPr>
-              <a:t>The object can be handle by one or more requests </a:t>
-            </a:r>
-          </a:p>
-          <a:p>
-            <a:pPr marL="285750" indent="-285750" algn="just">
-              <a:buFont typeface="Arial" panose="020B0604020202020204" pitchFamily="34" charset="0"/>
-              <a:buChar char="•"/>
-            </a:pPr>
-            <a:endParaRPr lang="en-US" sz="1400" dirty="0">
-              <a:solidFill>
-                <a:schemeClr val="bg1"/>
-              </a:solidFill>
-            </a:endParaRPr>
-          </a:p>
-          <a:p>
-            <a:pPr marL="285750" indent="-285750" algn="just">
-              <a:buFont typeface="Arial" panose="020B0604020202020204" pitchFamily="34" charset="0"/>
-              <a:buChar char="•"/>
-            </a:pPr>
-            <a:r>
-              <a:rPr lang="en-US" sz="1400" dirty="0">
-                <a:solidFill>
-                  <a:schemeClr val="bg1"/>
-                </a:solidFill>
-              </a:rPr>
-              <a:t>It’s wished that the request is addressed to a group of objects without explicitly specifying its receiver</a:t>
-            </a:r>
-          </a:p>
-        </p:txBody>
-      </p:sp>
-      <p:pic>
-        <p:nvPicPr>
-          <p:cNvPr id="4100" name="Picture 4" descr="Image result for homer thinking with glasses without background">
-            <a:extLst>
-              <a:ext uri="{FF2B5EF4-FFF2-40B4-BE49-F238E27FC236}">
-                <a16:creationId xmlns:a16="http://schemas.microsoft.com/office/drawing/2014/main" id="{5EC6A25D-704D-42F6-9728-C0D4D014EF54}"/>
+                <a16:creationId xmlns:a16="http://schemas.microsoft.com/office/drawing/2014/main" id="{11E286D0-5068-4F11-B530-2A07C6DE6257}"/>
               </a:ext>
             </a:extLst>
           </p:cNvPr>
@@ -6538,20 +6388,157 @@
         </p:blipFill>
         <p:spPr bwMode="auto">
           <a:xfrm>
-            <a:off x="6653171" y="1559256"/>
-            <a:ext cx="1707490" cy="2024988"/>
+            <a:off x="7228873" y="1877087"/>
+            <a:ext cx="1041660" cy="1222930"/>
           </a:xfrm>
           <a:prstGeom prst="rect">
             <a:avLst/>
           </a:prstGeom>
           <a:noFill/>
-          <a:extLst/>
+          <a:extLst>
+            <a:ext uri="{909E8E84-426E-40DD-AFC4-6F175D3DCCD1}">
+              <a14:hiddenFill xmlns:a14="http://schemas.microsoft.com/office/drawing/2010/main">
+                <a:solidFill>
+                  <a:srgbClr val="FFFFFF"/>
+                </a:solidFill>
+              </a14:hiddenFill>
+            </a:ext>
+          </a:extLst>
         </p:spPr>
       </p:pic>
+      <p:sp>
+        <p:nvSpPr>
+          <p:cNvPr id="8" name="TextBox 7">
+            <a:extLst>
+              <a:ext uri="{FF2B5EF4-FFF2-40B4-BE49-F238E27FC236}">
+                <a16:creationId xmlns:a16="http://schemas.microsoft.com/office/drawing/2014/main" id="{9C617690-E301-490D-911B-C2A27BA0B8DA}"/>
+              </a:ext>
+            </a:extLst>
+          </p:cNvPr>
+          <p:cNvSpPr txBox="1"/>
+          <p:nvPr/>
+        </p:nvSpPr>
+        <p:spPr>
+          <a:xfrm>
+            <a:off x="405634" y="1149724"/>
+            <a:ext cx="5920737" cy="2760612"/>
+          </a:xfrm>
+          <a:prstGeom prst="rect">
+            <a:avLst/>
+          </a:prstGeom>
+          <a:noFill/>
+        </p:spPr>
+        <p:txBody>
+          <a:bodyPr wrap="square" rtlCol="0">
+            <a:spAutoFit/>
+          </a:bodyPr>
+          <a:lstStyle/>
+          <a:p>
+            <a:pPr algn="just"/>
+            <a:r>
+              <a:rPr lang="en-US" sz="1400" dirty="0">
+                <a:solidFill>
+                  <a:schemeClr val="bg1"/>
+                </a:solidFill>
+              </a:rPr>
+              <a:t>Disadvantage:</a:t>
+            </a:r>
+          </a:p>
+          <a:p>
+            <a:pPr marL="742950" lvl="1" indent="-285750" algn="just">
+              <a:buFont typeface="Arial" panose="020B0604020202020204" pitchFamily="34" charset="0"/>
+              <a:buChar char="•"/>
+            </a:pPr>
+            <a:r>
+              <a:rPr lang="en-US" sz="1400" dirty="0">
+                <a:solidFill>
+                  <a:schemeClr val="bg1"/>
+                </a:solidFill>
+              </a:rPr>
+              <a:t>Easy to broke: if the developer doesn’t call the next handler the request can be lost on the way. (the execution is handled by subclasses instead of the super class)</a:t>
+            </a:r>
+          </a:p>
+          <a:p>
+            <a:pPr marL="742950" lvl="1" indent="-285750" algn="just">
+              <a:buFont typeface="Arial" panose="020B0604020202020204" pitchFamily="34" charset="0"/>
+              <a:buChar char="•"/>
+            </a:pPr>
+            <a:endParaRPr lang="en-US" sz="1400" dirty="0">
+              <a:solidFill>
+                <a:schemeClr val="bg1"/>
+              </a:solidFill>
+            </a:endParaRPr>
+          </a:p>
+          <a:p>
+            <a:pPr marL="742950" lvl="1" indent="-285750" algn="just">
+              <a:buFont typeface="Arial" panose="020B0604020202020204" pitchFamily="34" charset="0"/>
+              <a:buChar char="•"/>
+            </a:pPr>
+            <a:r>
+              <a:rPr lang="en-US" sz="1400" dirty="0">
+                <a:solidFill>
+                  <a:schemeClr val="bg1"/>
+                </a:solidFill>
+              </a:rPr>
+              <a:t>some requests may end up unhandled due to the wrong implementation of concrete handler</a:t>
+            </a:r>
+          </a:p>
+          <a:p>
+            <a:pPr marL="742950" lvl="1" indent="-285750" algn="just">
+              <a:buFont typeface="Arial" panose="020B0604020202020204" pitchFamily="34" charset="0"/>
+              <a:buChar char="•"/>
+            </a:pPr>
+            <a:endParaRPr lang="en-US" sz="1400" dirty="0">
+              <a:solidFill>
+                <a:schemeClr val="bg1"/>
+              </a:solidFill>
+            </a:endParaRPr>
+          </a:p>
+          <a:p>
+            <a:pPr marL="742950" lvl="1" indent="-285750" algn="just">
+              <a:buFont typeface="Arial" panose="020B0604020202020204" pitchFamily="34" charset="0"/>
+              <a:buChar char="•"/>
+            </a:pPr>
+            <a:r>
+              <a:rPr lang="en-US" sz="1400" dirty="0">
+                <a:solidFill>
+                  <a:schemeClr val="bg1"/>
+                </a:solidFill>
+              </a:rPr>
+              <a:t>Performance can be affected</a:t>
+            </a:r>
+          </a:p>
+          <a:p>
+            <a:pPr marL="742950" lvl="1" indent="-285750" algn="just">
+              <a:buFont typeface="Arial" panose="020B0604020202020204" pitchFamily="34" charset="0"/>
+              <a:buChar char="•"/>
+            </a:pPr>
+            <a:endParaRPr lang="en-US" sz="1400" dirty="0">
+              <a:solidFill>
+                <a:schemeClr val="bg1"/>
+              </a:solidFill>
+            </a:endParaRPr>
+          </a:p>
+          <a:p>
+            <a:pPr marL="742950" lvl="1" indent="-285750" algn="just">
+              <a:buFont typeface="Arial" panose="020B0604020202020204" pitchFamily="34" charset="0"/>
+              <a:buChar char="•"/>
+            </a:pPr>
+            <a:r>
+              <a:rPr lang="en-US" sz="1400" dirty="0">
+                <a:solidFill>
+                  <a:schemeClr val="bg1"/>
+                </a:solidFill>
+              </a:rPr>
+              <a:t>Debugging is not easy to do because the implementation may cause cycle calls</a:t>
+            </a:r>
+          </a:p>
+        </p:txBody>
+      </p:sp>
     </p:spTree>
     <p:extLst>
       <p:ext uri="{BB962C8B-B14F-4D97-AF65-F5344CB8AC3E}">
-        <p14:creationId xmlns:p14="http://schemas.microsoft.com/office/powerpoint/2010/main" val="1440524593"/>
+        <p14:creationId xmlns:p14="http://schemas.microsoft.com/office/powerpoint/2010/main" val="981103599"/>
       </p:ext>
     </p:extLst>
   </p:cSld>
@@ -7797,6 +7784,912 @@
 <file path=ppt/slides/slide21.xml><?xml version="1.0" encoding="utf-8"?>
 <p:sld xmlns:a="http://schemas.openxmlformats.org/drawingml/2006/main" xmlns:r="http://schemas.openxmlformats.org/officeDocument/2006/relationships" xmlns:p="http://schemas.openxmlformats.org/presentationml/2006/main">
   <p:cSld>
+    <p:bg>
+      <p:bgPr>
+        <a:solidFill>
+          <a:srgbClr val="000000"/>
+        </a:solidFill>
+        <a:effectLst/>
+      </p:bgPr>
+    </p:bg>
+    <p:spTree>
+      <p:nvGrpSpPr>
+        <p:cNvPr id="1" name=""/>
+        <p:cNvGrpSpPr/>
+        <p:nvPr/>
+      </p:nvGrpSpPr>
+      <p:grpSpPr>
+        <a:xfrm>
+          <a:off x="0" y="0"/>
+          <a:ext cx="0" cy="0"/>
+          <a:chOff x="0" y="0"/>
+          <a:chExt cx="0" cy="0"/>
+        </a:xfrm>
+      </p:grpSpPr>
+      <p:sp>
+        <p:nvSpPr>
+          <p:cNvPr id="161" name="CustomShape 1"/>
+          <p:cNvSpPr/>
+          <p:nvPr/>
+        </p:nvSpPr>
+        <p:spPr>
+          <a:xfrm>
+            <a:off x="4114800" y="1257120"/>
+            <a:ext cx="4774680" cy="2949120"/>
+          </a:xfrm>
+          <a:prstGeom prst="rect">
+            <a:avLst/>
+          </a:prstGeom>
+          <a:noFill/>
+          <a:ln>
+            <a:noFill/>
+          </a:ln>
+        </p:spPr>
+        <p:style>
+          <a:lnRef idx="0">
+            <a:scrgbClr r="0" g="0" b="0"/>
+          </a:lnRef>
+          <a:fillRef idx="0">
+            <a:scrgbClr r="0" g="0" b="0"/>
+          </a:fillRef>
+          <a:effectRef idx="0">
+            <a:scrgbClr r="0" g="0" b="0"/>
+          </a:effectRef>
+          <a:fontRef idx="minor"/>
+        </p:style>
+      </p:sp>
+      <p:sp>
+        <p:nvSpPr>
+          <p:cNvPr id="162" name="CustomShape 2"/>
+          <p:cNvSpPr/>
+          <p:nvPr/>
+        </p:nvSpPr>
+        <p:spPr>
+          <a:xfrm>
+            <a:off x="0" y="5118480"/>
+            <a:ext cx="9143640" cy="33120"/>
+          </a:xfrm>
+          <a:prstGeom prst="rect">
+            <a:avLst/>
+          </a:prstGeom>
+          <a:solidFill>
+            <a:srgbClr val="C1D82F"/>
+          </a:solidFill>
+          <a:ln>
+            <a:noFill/>
+          </a:ln>
+        </p:spPr>
+        <p:style>
+          <a:lnRef idx="0">
+            <a:scrgbClr r="0" g="0" b="0"/>
+          </a:lnRef>
+          <a:fillRef idx="0">
+            <a:scrgbClr r="0" g="0" b="0"/>
+          </a:fillRef>
+          <a:effectRef idx="0">
+            <a:scrgbClr r="0" g="0" b="0"/>
+          </a:effectRef>
+          <a:fontRef idx="minor"/>
+        </p:style>
+      </p:sp>
+      <p:sp>
+        <p:nvSpPr>
+          <p:cNvPr id="163" name="CustomShape 3"/>
+          <p:cNvSpPr/>
+          <p:nvPr/>
+        </p:nvSpPr>
+        <p:spPr>
+          <a:xfrm>
+            <a:off x="0" y="216360"/>
+            <a:ext cx="9143640" cy="552240"/>
+          </a:xfrm>
+          <a:prstGeom prst="rect">
+            <a:avLst/>
+          </a:prstGeom>
+          <a:noFill/>
+          <a:ln>
+            <a:noFill/>
+          </a:ln>
+        </p:spPr>
+        <p:style>
+          <a:lnRef idx="0">
+            <a:scrgbClr r="0" g="0" b="0"/>
+          </a:lnRef>
+          <a:fillRef idx="0">
+            <a:scrgbClr r="0" g="0" b="0"/>
+          </a:fillRef>
+          <a:effectRef idx="0">
+            <a:scrgbClr r="0" g="0" b="0"/>
+          </a:effectRef>
+          <a:fontRef idx="minor"/>
+        </p:style>
+        <p:txBody>
+          <a:bodyPr tIns="91440" bIns="91440">
+            <a:noAutofit/>
+          </a:bodyPr>
+          <a:lstStyle/>
+          <a:p>
+            <a:pPr algn="ctr">
+              <a:lnSpc>
+                <a:spcPct val="100000"/>
+              </a:lnSpc>
+            </a:pPr>
+            <a:r>
+              <a:rPr lang="en-US" sz="2400" dirty="0">
+                <a:solidFill>
+                  <a:srgbClr val="96B51A"/>
+                </a:solidFill>
+                <a:cs typeface="Arial" panose="020B0604020202020204"/>
+              </a:rPr>
+              <a:t>When to use it? </a:t>
+            </a:r>
+          </a:p>
+        </p:txBody>
+      </p:sp>
+      <p:pic>
+        <p:nvPicPr>
+          <p:cNvPr id="4100" name="Picture 4" descr="Image result for homer thinking with glasses without background">
+            <a:extLst>
+              <a:ext uri="{FF2B5EF4-FFF2-40B4-BE49-F238E27FC236}">
+                <a16:creationId xmlns:a16="http://schemas.microsoft.com/office/drawing/2014/main" id="{5EC6A25D-704D-42F6-9728-C0D4D014EF54}"/>
+              </a:ext>
+            </a:extLst>
+          </p:cNvPr>
+          <p:cNvPicPr>
+            <a:picLocks noChangeAspect="1" noChangeArrowheads="1"/>
+          </p:cNvPicPr>
+          <p:nvPr/>
+        </p:nvPicPr>
+        <p:blipFill>
+          <a:blip r:embed="rId2">
+            <a:extLst>
+              <a:ext uri="{28A0092B-C50C-407E-A947-70E740481C1C}">
+                <a14:useLocalDpi xmlns:a14="http://schemas.microsoft.com/office/drawing/2010/main" val="0"/>
+              </a:ext>
+            </a:extLst>
+          </a:blip>
+          <a:srcRect/>
+          <a:stretch>
+            <a:fillRect/>
+          </a:stretch>
+        </p:blipFill>
+        <p:spPr bwMode="auto">
+          <a:xfrm>
+            <a:off x="6653171" y="1559256"/>
+            <a:ext cx="1707490" cy="2024988"/>
+          </a:xfrm>
+          <a:prstGeom prst="rect">
+            <a:avLst/>
+          </a:prstGeom>
+          <a:noFill/>
+          <a:extLst/>
+        </p:spPr>
+      </p:pic>
+      <p:sp>
+        <p:nvSpPr>
+          <p:cNvPr id="3" name="Rectangle 2">
+            <a:extLst>
+              <a:ext uri="{FF2B5EF4-FFF2-40B4-BE49-F238E27FC236}">
+                <a16:creationId xmlns:a16="http://schemas.microsoft.com/office/drawing/2014/main" id="{000C933F-B8E0-42B1-9002-4022FDAE49AC}"/>
+              </a:ext>
+            </a:extLst>
+          </p:cNvPr>
+          <p:cNvSpPr/>
+          <p:nvPr/>
+        </p:nvSpPr>
+        <p:spPr>
+          <a:xfrm>
+            <a:off x="504265" y="1371421"/>
+            <a:ext cx="5741894" cy="584775"/>
+          </a:xfrm>
+          <a:prstGeom prst="rect">
+            <a:avLst/>
+          </a:prstGeom>
+        </p:spPr>
+        <p:txBody>
+          <a:bodyPr wrap="square">
+            <a:spAutoFit/>
+          </a:bodyPr>
+          <a:lstStyle/>
+          <a:p>
+            <a:r>
+              <a:rPr lang="en-US" sz="1400" dirty="0">
+                <a:solidFill>
+                  <a:schemeClr val="bg1"/>
+                </a:solidFill>
+              </a:rPr>
+              <a:t>Application needs only one, instance of an object and global access are necessary</a:t>
+            </a:r>
+            <a:r>
+              <a:rPr lang="en-US" dirty="0">
+                <a:solidFill>
+                  <a:srgbClr val="444444"/>
+                </a:solidFill>
+                <a:latin typeface="PT Sans"/>
+              </a:rPr>
+              <a:t>.</a:t>
+            </a:r>
+            <a:endParaRPr lang="en-US" dirty="0"/>
+          </a:p>
+        </p:txBody>
+      </p:sp>
+    </p:spTree>
+    <p:extLst>
+      <p:ext uri="{BB962C8B-B14F-4D97-AF65-F5344CB8AC3E}">
+        <p14:creationId xmlns:p14="http://schemas.microsoft.com/office/powerpoint/2010/main" val="1073355550"/>
+      </p:ext>
+    </p:extLst>
+  </p:cSld>
+  <p:clrMapOvr>
+    <a:masterClrMapping/>
+  </p:clrMapOvr>
+</p:sld>
+</file>
+
+<file path=ppt/slides/slide22.xml><?xml version="1.0" encoding="utf-8"?>
+<p:sld xmlns:a="http://schemas.openxmlformats.org/drawingml/2006/main" xmlns:r="http://schemas.openxmlformats.org/officeDocument/2006/relationships" xmlns:p="http://schemas.openxmlformats.org/presentationml/2006/main">
+  <p:cSld>
+    <p:bg>
+      <p:bgPr>
+        <a:solidFill>
+          <a:srgbClr val="000000"/>
+        </a:solidFill>
+        <a:effectLst/>
+      </p:bgPr>
+    </p:bg>
+    <p:spTree>
+      <p:nvGrpSpPr>
+        <p:cNvPr id="1" name=""/>
+        <p:cNvGrpSpPr/>
+        <p:nvPr/>
+      </p:nvGrpSpPr>
+      <p:grpSpPr>
+        <a:xfrm>
+          <a:off x="0" y="0"/>
+          <a:ext cx="0" cy="0"/>
+          <a:chOff x="0" y="0"/>
+          <a:chExt cx="0" cy="0"/>
+        </a:xfrm>
+      </p:grpSpPr>
+      <p:sp>
+        <p:nvSpPr>
+          <p:cNvPr id="161" name="CustomShape 1"/>
+          <p:cNvSpPr/>
+          <p:nvPr/>
+        </p:nvSpPr>
+        <p:spPr>
+          <a:xfrm>
+            <a:off x="4114800" y="1257120"/>
+            <a:ext cx="4774680" cy="2949120"/>
+          </a:xfrm>
+          <a:prstGeom prst="rect">
+            <a:avLst/>
+          </a:prstGeom>
+          <a:noFill/>
+          <a:ln>
+            <a:noFill/>
+          </a:ln>
+        </p:spPr>
+        <p:style>
+          <a:lnRef idx="0">
+            <a:scrgbClr r="0" g="0" b="0"/>
+          </a:lnRef>
+          <a:fillRef idx="0">
+            <a:scrgbClr r="0" g="0" b="0"/>
+          </a:fillRef>
+          <a:effectRef idx="0">
+            <a:scrgbClr r="0" g="0" b="0"/>
+          </a:effectRef>
+          <a:fontRef idx="minor"/>
+        </p:style>
+      </p:sp>
+      <p:sp>
+        <p:nvSpPr>
+          <p:cNvPr id="162" name="CustomShape 2"/>
+          <p:cNvSpPr/>
+          <p:nvPr/>
+        </p:nvSpPr>
+        <p:spPr>
+          <a:xfrm>
+            <a:off x="0" y="5118480"/>
+            <a:ext cx="9143640" cy="33120"/>
+          </a:xfrm>
+          <a:prstGeom prst="rect">
+            <a:avLst/>
+          </a:prstGeom>
+          <a:solidFill>
+            <a:srgbClr val="C1D82F"/>
+          </a:solidFill>
+          <a:ln>
+            <a:noFill/>
+          </a:ln>
+        </p:spPr>
+        <p:style>
+          <a:lnRef idx="0">
+            <a:scrgbClr r="0" g="0" b="0"/>
+          </a:lnRef>
+          <a:fillRef idx="0">
+            <a:scrgbClr r="0" g="0" b="0"/>
+          </a:fillRef>
+          <a:effectRef idx="0">
+            <a:scrgbClr r="0" g="0" b="0"/>
+          </a:effectRef>
+          <a:fontRef idx="minor"/>
+        </p:style>
+      </p:sp>
+      <p:sp>
+        <p:nvSpPr>
+          <p:cNvPr id="163" name="CustomShape 3"/>
+          <p:cNvSpPr/>
+          <p:nvPr/>
+        </p:nvSpPr>
+        <p:spPr>
+          <a:xfrm>
+            <a:off x="0" y="216360"/>
+            <a:ext cx="9143640" cy="552240"/>
+          </a:xfrm>
+          <a:prstGeom prst="rect">
+            <a:avLst/>
+          </a:prstGeom>
+          <a:noFill/>
+          <a:ln>
+            <a:noFill/>
+          </a:ln>
+        </p:spPr>
+        <p:style>
+          <a:lnRef idx="0">
+            <a:scrgbClr r="0" g="0" b="0"/>
+          </a:lnRef>
+          <a:fillRef idx="0">
+            <a:scrgbClr r="0" g="0" b="0"/>
+          </a:fillRef>
+          <a:effectRef idx="0">
+            <a:scrgbClr r="0" g="0" b="0"/>
+          </a:effectRef>
+          <a:fontRef idx="minor"/>
+        </p:style>
+        <p:txBody>
+          <a:bodyPr tIns="91440" bIns="91440">
+            <a:noAutofit/>
+          </a:bodyPr>
+          <a:lstStyle/>
+          <a:p>
+            <a:pPr algn="ctr">
+              <a:lnSpc>
+                <a:spcPct val="100000"/>
+              </a:lnSpc>
+            </a:pPr>
+            <a:r>
+              <a:rPr lang="en-US" sz="2400" dirty="0">
+                <a:solidFill>
+                  <a:srgbClr val="96B51A"/>
+                </a:solidFill>
+                <a:cs typeface="Arial" panose="020B0604020202020204"/>
+              </a:rPr>
+              <a:t>Advantage / Disadvantage</a:t>
+            </a:r>
+          </a:p>
+        </p:txBody>
+      </p:sp>
+      <p:sp>
+        <p:nvSpPr>
+          <p:cNvPr id="2" name="TextBox 1">
+            <a:extLst>
+              <a:ext uri="{FF2B5EF4-FFF2-40B4-BE49-F238E27FC236}">
+                <a16:creationId xmlns:a16="http://schemas.microsoft.com/office/drawing/2014/main" id="{8B1319CA-707D-4666-A070-B3803D5C1BAF}"/>
+              </a:ext>
+            </a:extLst>
+          </p:cNvPr>
+          <p:cNvSpPr txBox="1"/>
+          <p:nvPr/>
+        </p:nvSpPr>
+        <p:spPr>
+          <a:xfrm>
+            <a:off x="405635" y="1149724"/>
+            <a:ext cx="6579956" cy="2462213"/>
+          </a:xfrm>
+          <a:prstGeom prst="rect">
+            <a:avLst/>
+          </a:prstGeom>
+          <a:noFill/>
+        </p:spPr>
+        <p:txBody>
+          <a:bodyPr wrap="square" rtlCol="0">
+            <a:spAutoFit/>
+          </a:bodyPr>
+          <a:lstStyle/>
+          <a:p>
+            <a:pPr algn="just"/>
+            <a:r>
+              <a:rPr lang="en-US" sz="1400" dirty="0">
+                <a:solidFill>
+                  <a:schemeClr val="bg1"/>
+                </a:solidFill>
+              </a:rPr>
+              <a:t>Advantage:</a:t>
+            </a:r>
+          </a:p>
+          <a:p>
+            <a:pPr algn="just"/>
+            <a:endParaRPr lang="en-US" sz="1400" dirty="0">
+              <a:solidFill>
+                <a:schemeClr val="bg1"/>
+              </a:solidFill>
+            </a:endParaRPr>
+          </a:p>
+          <a:p>
+            <a:pPr marL="742950" lvl="1" indent="-285750" algn="just">
+              <a:buFont typeface="Arial" panose="020B0604020202020204" pitchFamily="34" charset="0"/>
+              <a:buChar char="•"/>
+            </a:pPr>
+            <a:r>
+              <a:rPr lang="en-US" sz="1400" dirty="0">
+                <a:solidFill>
+                  <a:schemeClr val="bg1"/>
+                </a:solidFill>
+              </a:rPr>
+              <a:t>Global  state</a:t>
+            </a:r>
+          </a:p>
+          <a:p>
+            <a:pPr marL="742950" lvl="1" indent="-285750" algn="just">
+              <a:buFont typeface="Arial" panose="020B0604020202020204" pitchFamily="34" charset="0"/>
+              <a:buChar char="•"/>
+            </a:pPr>
+            <a:endParaRPr lang="en-US" sz="1400" dirty="0">
+              <a:solidFill>
+                <a:schemeClr val="bg1"/>
+              </a:solidFill>
+            </a:endParaRPr>
+          </a:p>
+          <a:p>
+            <a:pPr marL="742950" lvl="1" indent="-285750" algn="just">
+              <a:buFont typeface="Arial" panose="020B0604020202020204" pitchFamily="34" charset="0"/>
+              <a:buChar char="•"/>
+            </a:pPr>
+            <a:r>
+              <a:rPr lang="en-US" sz="1400" dirty="0">
+                <a:solidFill>
+                  <a:schemeClr val="bg1"/>
+                </a:solidFill>
+              </a:rPr>
+              <a:t>The singleton class has the flexibility to change the instantiation process</a:t>
+            </a:r>
+          </a:p>
+          <a:p>
+            <a:pPr marL="742950" lvl="1" indent="-285750" algn="just">
+              <a:buFont typeface="Arial" panose="020B0604020202020204" pitchFamily="34" charset="0"/>
+              <a:buChar char="•"/>
+            </a:pPr>
+            <a:endParaRPr lang="en-US" sz="1400" dirty="0">
+              <a:solidFill>
+                <a:schemeClr val="bg1"/>
+              </a:solidFill>
+            </a:endParaRPr>
+          </a:p>
+          <a:p>
+            <a:pPr marL="742950" lvl="1" indent="-285750" algn="just">
+              <a:buFont typeface="Arial" panose="020B0604020202020204" pitchFamily="34" charset="0"/>
+              <a:buChar char="•"/>
+            </a:pPr>
+            <a:r>
+              <a:rPr lang="en-US" sz="1400" dirty="0">
+                <a:solidFill>
+                  <a:schemeClr val="bg1"/>
+                </a:solidFill>
+              </a:rPr>
+              <a:t>The implementation is easy and can be transform to a pool instances handle </a:t>
+            </a:r>
+          </a:p>
+          <a:p>
+            <a:pPr algn="just"/>
+            <a:endParaRPr lang="en-US" sz="1400" dirty="0">
+              <a:solidFill>
+                <a:schemeClr val="bg1"/>
+              </a:solidFill>
+            </a:endParaRPr>
+          </a:p>
+          <a:p>
+            <a:pPr marL="342900" indent="-342900" algn="just">
+              <a:buFont typeface="Arial" panose="020B0604020202020204" pitchFamily="34" charset="0"/>
+              <a:buChar char="•"/>
+            </a:pPr>
+            <a:endParaRPr lang="en-US" sz="1400" dirty="0">
+              <a:solidFill>
+                <a:schemeClr val="bg1"/>
+              </a:solidFill>
+            </a:endParaRPr>
+          </a:p>
+        </p:txBody>
+      </p:sp>
+      <p:pic>
+        <p:nvPicPr>
+          <p:cNvPr id="3080" name="Picture 8" descr="Related image">
+            <a:extLst>
+              <a:ext uri="{FF2B5EF4-FFF2-40B4-BE49-F238E27FC236}">
+                <a16:creationId xmlns:a16="http://schemas.microsoft.com/office/drawing/2014/main" id="{7195DF56-9A98-41BE-83E1-DF60B5FDF8EC}"/>
+              </a:ext>
+            </a:extLst>
+          </p:cNvPr>
+          <p:cNvPicPr>
+            <a:picLocks noChangeAspect="1" noChangeArrowheads="1"/>
+          </p:cNvPicPr>
+          <p:nvPr/>
+        </p:nvPicPr>
+        <p:blipFill>
+          <a:blip r:embed="rId2">
+            <a:extLst>
+              <a:ext uri="{28A0092B-C50C-407E-A947-70E740481C1C}">
+                <a14:useLocalDpi xmlns:a14="http://schemas.microsoft.com/office/drawing/2010/main" val="0"/>
+              </a:ext>
+            </a:extLst>
+          </a:blip>
+          <a:srcRect/>
+          <a:stretch>
+            <a:fillRect/>
+          </a:stretch>
+        </p:blipFill>
+        <p:spPr bwMode="auto">
+          <a:xfrm>
+            <a:off x="7486262" y="1680840"/>
+            <a:ext cx="1252103" cy="1544276"/>
+          </a:xfrm>
+          <a:prstGeom prst="rect">
+            <a:avLst/>
+          </a:prstGeom>
+          <a:noFill/>
+          <a:extLst>
+            <a:ext uri="{909E8E84-426E-40DD-AFC4-6F175D3DCCD1}">
+              <a14:hiddenFill xmlns:a14="http://schemas.microsoft.com/office/drawing/2010/main">
+                <a:solidFill>
+                  <a:srgbClr val="FFFFFF"/>
+                </a:solidFill>
+              </a14:hiddenFill>
+            </a:ext>
+          </a:extLst>
+        </p:spPr>
+      </p:pic>
+    </p:spTree>
+    <p:extLst>
+      <p:ext uri="{BB962C8B-B14F-4D97-AF65-F5344CB8AC3E}">
+        <p14:creationId xmlns:p14="http://schemas.microsoft.com/office/powerpoint/2010/main" val="389099956"/>
+      </p:ext>
+    </p:extLst>
+  </p:cSld>
+  <p:clrMapOvr>
+    <a:masterClrMapping/>
+  </p:clrMapOvr>
+</p:sld>
+</file>
+
+<file path=ppt/slides/slide23.xml><?xml version="1.0" encoding="utf-8"?>
+<p:sld xmlns:a="http://schemas.openxmlformats.org/drawingml/2006/main" xmlns:r="http://schemas.openxmlformats.org/officeDocument/2006/relationships" xmlns:p="http://schemas.openxmlformats.org/presentationml/2006/main">
+  <p:cSld>
+    <p:bg>
+      <p:bgPr>
+        <a:solidFill>
+          <a:srgbClr val="000000"/>
+        </a:solidFill>
+        <a:effectLst/>
+      </p:bgPr>
+    </p:bg>
+    <p:spTree>
+      <p:nvGrpSpPr>
+        <p:cNvPr id="1" name=""/>
+        <p:cNvGrpSpPr/>
+        <p:nvPr/>
+      </p:nvGrpSpPr>
+      <p:grpSpPr>
+        <a:xfrm>
+          <a:off x="0" y="0"/>
+          <a:ext cx="0" cy="0"/>
+          <a:chOff x="0" y="0"/>
+          <a:chExt cx="0" cy="0"/>
+        </a:xfrm>
+      </p:grpSpPr>
+      <p:sp>
+        <p:nvSpPr>
+          <p:cNvPr id="161" name="CustomShape 1"/>
+          <p:cNvSpPr/>
+          <p:nvPr/>
+        </p:nvSpPr>
+        <p:spPr>
+          <a:xfrm>
+            <a:off x="4114800" y="1257120"/>
+            <a:ext cx="4774680" cy="2949120"/>
+          </a:xfrm>
+          <a:prstGeom prst="rect">
+            <a:avLst/>
+          </a:prstGeom>
+          <a:noFill/>
+          <a:ln>
+            <a:noFill/>
+          </a:ln>
+        </p:spPr>
+        <p:style>
+          <a:lnRef idx="0">
+            <a:scrgbClr r="0" g="0" b="0"/>
+          </a:lnRef>
+          <a:fillRef idx="0">
+            <a:scrgbClr r="0" g="0" b="0"/>
+          </a:fillRef>
+          <a:effectRef idx="0">
+            <a:scrgbClr r="0" g="0" b="0"/>
+          </a:effectRef>
+          <a:fontRef idx="minor"/>
+        </p:style>
+      </p:sp>
+      <p:sp>
+        <p:nvSpPr>
+          <p:cNvPr id="162" name="CustomShape 2"/>
+          <p:cNvSpPr/>
+          <p:nvPr/>
+        </p:nvSpPr>
+        <p:spPr>
+          <a:xfrm>
+            <a:off x="0" y="5118480"/>
+            <a:ext cx="9143640" cy="33120"/>
+          </a:xfrm>
+          <a:prstGeom prst="rect">
+            <a:avLst/>
+          </a:prstGeom>
+          <a:solidFill>
+            <a:srgbClr val="C1D82F"/>
+          </a:solidFill>
+          <a:ln>
+            <a:noFill/>
+          </a:ln>
+        </p:spPr>
+        <p:style>
+          <a:lnRef idx="0">
+            <a:scrgbClr r="0" g="0" b="0"/>
+          </a:lnRef>
+          <a:fillRef idx="0">
+            <a:scrgbClr r="0" g="0" b="0"/>
+          </a:fillRef>
+          <a:effectRef idx="0">
+            <a:scrgbClr r="0" g="0" b="0"/>
+          </a:effectRef>
+          <a:fontRef idx="minor"/>
+        </p:style>
+      </p:sp>
+      <p:sp>
+        <p:nvSpPr>
+          <p:cNvPr id="163" name="CustomShape 3"/>
+          <p:cNvSpPr/>
+          <p:nvPr/>
+        </p:nvSpPr>
+        <p:spPr>
+          <a:xfrm>
+            <a:off x="0" y="216360"/>
+            <a:ext cx="9143640" cy="552240"/>
+          </a:xfrm>
+          <a:prstGeom prst="rect">
+            <a:avLst/>
+          </a:prstGeom>
+          <a:noFill/>
+          <a:ln>
+            <a:noFill/>
+          </a:ln>
+        </p:spPr>
+        <p:style>
+          <a:lnRef idx="0">
+            <a:scrgbClr r="0" g="0" b="0"/>
+          </a:lnRef>
+          <a:fillRef idx="0">
+            <a:scrgbClr r="0" g="0" b="0"/>
+          </a:fillRef>
+          <a:effectRef idx="0">
+            <a:scrgbClr r="0" g="0" b="0"/>
+          </a:effectRef>
+          <a:fontRef idx="minor"/>
+        </p:style>
+        <p:txBody>
+          <a:bodyPr tIns="91440" bIns="91440">
+            <a:noAutofit/>
+          </a:bodyPr>
+          <a:lstStyle/>
+          <a:p>
+            <a:pPr algn="ctr">
+              <a:lnSpc>
+                <a:spcPct val="100000"/>
+              </a:lnSpc>
+            </a:pPr>
+            <a:r>
+              <a:rPr lang="en-US" sz="2400" dirty="0">
+                <a:solidFill>
+                  <a:srgbClr val="96B51A"/>
+                </a:solidFill>
+                <a:cs typeface="Arial" panose="020B0604020202020204"/>
+              </a:rPr>
+              <a:t>Advantage / Disadvantage</a:t>
+            </a:r>
+          </a:p>
+        </p:txBody>
+      </p:sp>
+      <p:pic>
+        <p:nvPicPr>
+          <p:cNvPr id="2052" name="Picture 4" descr="Image result for homer doh without background">
+            <a:extLst>
+              <a:ext uri="{FF2B5EF4-FFF2-40B4-BE49-F238E27FC236}">
+                <a16:creationId xmlns:a16="http://schemas.microsoft.com/office/drawing/2014/main" id="{11E286D0-5068-4F11-B530-2A07C6DE6257}"/>
+              </a:ext>
+            </a:extLst>
+          </p:cNvPr>
+          <p:cNvPicPr>
+            <a:picLocks noChangeAspect="1" noChangeArrowheads="1"/>
+          </p:cNvPicPr>
+          <p:nvPr/>
+        </p:nvPicPr>
+        <p:blipFill>
+          <a:blip r:embed="rId2">
+            <a:extLst>
+              <a:ext uri="{28A0092B-C50C-407E-A947-70E740481C1C}">
+                <a14:useLocalDpi xmlns:a14="http://schemas.microsoft.com/office/drawing/2010/main" val="0"/>
+              </a:ext>
+            </a:extLst>
+          </a:blip>
+          <a:srcRect/>
+          <a:stretch>
+            <a:fillRect/>
+          </a:stretch>
+        </p:blipFill>
+        <p:spPr bwMode="auto">
+          <a:xfrm>
+            <a:off x="7228873" y="1877087"/>
+            <a:ext cx="1041660" cy="1222930"/>
+          </a:xfrm>
+          <a:prstGeom prst="rect">
+            <a:avLst/>
+          </a:prstGeom>
+          <a:noFill/>
+          <a:extLst>
+            <a:ext uri="{909E8E84-426E-40DD-AFC4-6F175D3DCCD1}">
+              <a14:hiddenFill xmlns:a14="http://schemas.microsoft.com/office/drawing/2010/main">
+                <a:solidFill>
+                  <a:srgbClr val="FFFFFF"/>
+                </a:solidFill>
+              </a14:hiddenFill>
+            </a:ext>
+          </a:extLst>
+        </p:spPr>
+      </p:pic>
+      <p:sp>
+        <p:nvSpPr>
+          <p:cNvPr id="8" name="TextBox 7">
+            <a:extLst>
+              <a:ext uri="{FF2B5EF4-FFF2-40B4-BE49-F238E27FC236}">
+                <a16:creationId xmlns:a16="http://schemas.microsoft.com/office/drawing/2014/main" id="{9C617690-E301-490D-911B-C2A27BA0B8DA}"/>
+              </a:ext>
+            </a:extLst>
+          </p:cNvPr>
+          <p:cNvSpPr txBox="1"/>
+          <p:nvPr/>
+        </p:nvSpPr>
+        <p:spPr>
+          <a:xfrm>
+            <a:off x="439251" y="1189213"/>
+            <a:ext cx="5920737" cy="1815882"/>
+          </a:xfrm>
+          <a:prstGeom prst="rect">
+            <a:avLst/>
+          </a:prstGeom>
+          <a:noFill/>
+        </p:spPr>
+        <p:txBody>
+          <a:bodyPr wrap="square" rtlCol="0">
+            <a:spAutoFit/>
+          </a:bodyPr>
+          <a:lstStyle/>
+          <a:p>
+            <a:pPr algn="just"/>
+            <a:r>
+              <a:rPr lang="en-US" sz="1400" dirty="0">
+                <a:solidFill>
+                  <a:schemeClr val="bg1"/>
+                </a:solidFill>
+              </a:rPr>
+              <a:t>Disadvantage:</a:t>
+            </a:r>
+          </a:p>
+          <a:p>
+            <a:pPr algn="just"/>
+            <a:endParaRPr lang="en-US" sz="1400" dirty="0">
+              <a:solidFill>
+                <a:schemeClr val="bg1"/>
+              </a:solidFill>
+            </a:endParaRPr>
+          </a:p>
+          <a:p>
+            <a:pPr marL="742950" lvl="1" indent="-285750" algn="just">
+              <a:buFont typeface="Arial" panose="020B0604020202020204" pitchFamily="34" charset="0"/>
+              <a:buChar char="•"/>
+            </a:pPr>
+            <a:r>
+              <a:rPr lang="en-US" sz="1400" dirty="0">
+                <a:solidFill>
+                  <a:schemeClr val="bg1"/>
+                </a:solidFill>
+              </a:rPr>
+              <a:t>Someone calls it “antipattern”</a:t>
+            </a:r>
+          </a:p>
+          <a:p>
+            <a:pPr lvl="1" algn="just"/>
+            <a:endParaRPr lang="en-US" sz="1400" dirty="0">
+              <a:solidFill>
+                <a:schemeClr val="bg1"/>
+              </a:solidFill>
+            </a:endParaRPr>
+          </a:p>
+          <a:p>
+            <a:pPr marL="742950" lvl="1" indent="-285750" algn="just">
+              <a:buFont typeface="Arial" panose="020B0604020202020204" pitchFamily="34" charset="0"/>
+              <a:buChar char="•"/>
+            </a:pPr>
+            <a:r>
+              <a:rPr lang="en-US" sz="1400" dirty="0">
+                <a:solidFill>
+                  <a:schemeClr val="bg1"/>
+                </a:solidFill>
+              </a:rPr>
+              <a:t>Can violate the Single Responsibility </a:t>
+            </a:r>
+          </a:p>
+          <a:p>
+            <a:pPr marL="742950" lvl="1" indent="-285750" algn="just">
+              <a:buFont typeface="Arial" panose="020B0604020202020204" pitchFamily="34" charset="0"/>
+              <a:buChar char="•"/>
+            </a:pPr>
+            <a:endParaRPr lang="en-US" sz="1400" dirty="0">
+              <a:solidFill>
+                <a:schemeClr val="bg1"/>
+              </a:solidFill>
+            </a:endParaRPr>
+          </a:p>
+          <a:p>
+            <a:pPr marL="742950" lvl="1" indent="-285750" algn="just">
+              <a:buFont typeface="Arial" panose="020B0604020202020204" pitchFamily="34" charset="0"/>
+              <a:buChar char="•"/>
+            </a:pPr>
+            <a:r>
+              <a:rPr lang="en-US" sz="1400" dirty="0">
+                <a:solidFill>
+                  <a:schemeClr val="bg1"/>
+                </a:solidFill>
+              </a:rPr>
+              <a:t>Not always is thread safe  </a:t>
+            </a:r>
+          </a:p>
+          <a:p>
+            <a:pPr marL="742950" lvl="1" indent="-285750" algn="just">
+              <a:buFont typeface="Arial" panose="020B0604020202020204" pitchFamily="34" charset="0"/>
+              <a:buChar char="•"/>
+            </a:pPr>
+            <a:endParaRPr lang="en-US" sz="1400" dirty="0">
+              <a:solidFill>
+                <a:schemeClr val="bg1"/>
+              </a:solidFill>
+            </a:endParaRPr>
+          </a:p>
+        </p:txBody>
+      </p:sp>
+    </p:spTree>
+    <p:extLst>
+      <p:ext uri="{BB962C8B-B14F-4D97-AF65-F5344CB8AC3E}">
+        <p14:creationId xmlns:p14="http://schemas.microsoft.com/office/powerpoint/2010/main" val="3419465595"/>
+      </p:ext>
+    </p:extLst>
+  </p:cSld>
+  <p:clrMapOvr>
+    <a:masterClrMapping/>
+  </p:clrMapOvr>
+</p:sld>
+</file>
+
+<file path=ppt/slides/slide24.xml><?xml version="1.0" encoding="utf-8"?>
+<p:sld xmlns:a="http://schemas.openxmlformats.org/drawingml/2006/main" xmlns:r="http://schemas.openxmlformats.org/officeDocument/2006/relationships" xmlns:p="http://schemas.openxmlformats.org/presentationml/2006/main">
+  <p:cSld>
     <p:spTree>
       <p:nvGrpSpPr>
         <p:cNvPr id="1" name=""/>
@@ -7920,7 +8813,7 @@
 </p:sld>
 </file>
 
-<file path=ppt/slides/slide22.xml><?xml version="1.0" encoding="utf-8"?>
+<file path=ppt/slides/slide25.xml><?xml version="1.0" encoding="utf-8"?>
 <p:sld xmlns:a="http://schemas.openxmlformats.org/drawingml/2006/main" xmlns:r="http://schemas.openxmlformats.org/officeDocument/2006/relationships" xmlns:p="http://schemas.openxmlformats.org/presentationml/2006/main">
   <p:cSld>
     <p:bg>

</xml_diff>